<commit_message>
iot aws cloud seq
</commit_message>
<xml_diff>
--- a/fig/aws-iot-components-v01.pptx
+++ b/fig/aws-iot-components-v01.pptx
@@ -2403,7 +2403,7 @@
                 <a:ea typeface="Open Sans Light" charset="0"/>
                 <a:cs typeface="Open Sans Light"/>
               </a:rPr>
-              <a:t>laptop PC</a:t>
+              <a:t>Downloads folder</a:t>
             </a:r>
             <a:endParaRPr lang="en-US" sz="1600" dirty="0">
               <a:latin typeface="Open Sans Light"/>
@@ -4547,33 +4547,15 @@
                                   </p:childTnLst>
                                 </p:cTn>
                               </p:par>
-                            </p:childTnLst>
-                          </p:cTn>
-                        </p:par>
-                      </p:childTnLst>
-                    </p:cTn>
-                  </p:par>
-                  <p:par>
-                    <p:cTn id="11" fill="hold">
-                      <p:stCondLst>
-                        <p:cond delay="indefinite"/>
-                      </p:stCondLst>
-                      <p:childTnLst>
-                        <p:par>
-                          <p:cTn id="12" fill="hold">
-                            <p:stCondLst>
-                              <p:cond delay="0"/>
-                            </p:stCondLst>
-                            <p:childTnLst>
                               <p:par>
-                                <p:cTn id="13" presetID="1" presetClass="entr" presetSubtype="0" fill="hold" grpId="0" nodeType="clickEffect">
+                                <p:cTn id="11" presetID="1" presetClass="entr" presetSubtype="0" fill="hold" grpId="0" nodeType="withEffect">
                                   <p:stCondLst>
                                     <p:cond delay="0"/>
                                   </p:stCondLst>
                                   <p:childTnLst>
                                     <p:set>
                                       <p:cBhvr>
-                                        <p:cTn id="14" dur="1" fill="hold">
+                                        <p:cTn id="12" dur="1" fill="hold">
                                           <p:stCondLst>
                                             <p:cond delay="0"/>
                                           </p:stCondLst>
@@ -4599,19 +4581,46 @@
                     </p:cTn>
                   </p:par>
                   <p:par>
-                    <p:cTn id="15" fill="hold">
+                    <p:cTn id="13" fill="hold">
                       <p:stCondLst>
                         <p:cond delay="indefinite"/>
                       </p:stCondLst>
                       <p:childTnLst>
                         <p:par>
-                          <p:cTn id="16" fill="hold">
+                          <p:cTn id="14" fill="hold">
                             <p:stCondLst>
                               <p:cond delay="0"/>
                             </p:stCondLst>
                             <p:childTnLst>
                               <p:par>
-                                <p:cTn id="17" presetID="1" presetClass="entr" presetSubtype="0" fill="hold" grpId="0" nodeType="clickEffect">
+                                <p:cTn id="15" presetID="1" presetClass="entr" presetSubtype="0" fill="hold" grpId="0" nodeType="clickEffect">
+                                  <p:stCondLst>
+                                    <p:cond delay="0"/>
+                                  </p:stCondLst>
+                                  <p:childTnLst>
+                                    <p:set>
+                                      <p:cBhvr>
+                                        <p:cTn id="16" dur="1" fill="hold">
+                                          <p:stCondLst>
+                                            <p:cond delay="0"/>
+                                          </p:stCondLst>
+                                        </p:cTn>
+                                        <p:tgtEl>
+                                          <p:spTgt spid="38"/>
+                                        </p:tgtEl>
+                                        <p:attrNameLst>
+                                          <p:attrName>style.visibility</p:attrName>
+                                        </p:attrNameLst>
+                                      </p:cBhvr>
+                                      <p:to>
+                                        <p:strVal val="visible"/>
+                                      </p:to>
+                                    </p:set>
+                                  </p:childTnLst>
+                                </p:cTn>
+                              </p:par>
+                              <p:par>
+                                <p:cTn id="17" presetID="1" presetClass="entr" presetSubtype="0" fill="hold" nodeType="withEffect">
                                   <p:stCondLst>
                                     <p:cond delay="0"/>
                                   </p:stCondLst>
@@ -4619,6 +4628,78 @@
                                     <p:set>
                                       <p:cBhvr>
                                         <p:cTn id="18" dur="1" fill="hold">
+                                          <p:stCondLst>
+                                            <p:cond delay="0"/>
+                                          </p:stCondLst>
+                                        </p:cTn>
+                                        <p:tgtEl>
+                                          <p:spTgt spid="57"/>
+                                        </p:tgtEl>
+                                        <p:attrNameLst>
+                                          <p:attrName>style.visibility</p:attrName>
+                                        </p:attrNameLst>
+                                      </p:cBhvr>
+                                      <p:to>
+                                        <p:strVal val="visible"/>
+                                      </p:to>
+                                    </p:set>
+                                  </p:childTnLst>
+                                </p:cTn>
+                              </p:par>
+                              <p:par>
+                                <p:cTn id="19" presetID="1" presetClass="entr" presetSubtype="0" fill="hold" grpId="0" nodeType="withEffect">
+                                  <p:stCondLst>
+                                    <p:cond delay="0"/>
+                                  </p:stCondLst>
+                                  <p:childTnLst>
+                                    <p:set>
+                                      <p:cBhvr>
+                                        <p:cTn id="20" dur="1" fill="hold">
+                                          <p:stCondLst>
+                                            <p:cond delay="0"/>
+                                          </p:stCondLst>
+                                        </p:cTn>
+                                        <p:tgtEl>
+                                          <p:spTgt spid="39"/>
+                                        </p:tgtEl>
+                                        <p:attrNameLst>
+                                          <p:attrName>style.visibility</p:attrName>
+                                        </p:attrNameLst>
+                                      </p:cBhvr>
+                                      <p:to>
+                                        <p:strVal val="visible"/>
+                                      </p:to>
+                                    </p:set>
+                                  </p:childTnLst>
+                                </p:cTn>
+                              </p:par>
+                            </p:childTnLst>
+                          </p:cTn>
+                        </p:par>
+                      </p:childTnLst>
+                    </p:cTn>
+                  </p:par>
+                  <p:par>
+                    <p:cTn id="21" fill="hold">
+                      <p:stCondLst>
+                        <p:cond delay="indefinite"/>
+                      </p:stCondLst>
+                      <p:childTnLst>
+                        <p:par>
+                          <p:cTn id="22" fill="hold">
+                            <p:stCondLst>
+                              <p:cond delay="0"/>
+                            </p:stCondLst>
+                            <p:childTnLst>
+                              <p:par>
+                                <p:cTn id="23" presetID="1" presetClass="entr" presetSubtype="0" fill="hold" grpId="0" nodeType="clickEffect">
+                                  <p:stCondLst>
+                                    <p:cond delay="0"/>
+                                  </p:stCondLst>
+                                  <p:childTnLst>
+                                    <p:set>
+                                      <p:cBhvr>
+                                        <p:cTn id="24" dur="1" fill="hold">
                                           <p:stCondLst>
                                             <p:cond delay="0"/>
                                           </p:stCondLst>
@@ -4644,125 +4725,26 @@
                     </p:cTn>
                   </p:par>
                   <p:par>
-                    <p:cTn id="19" fill="hold">
+                    <p:cTn id="25" fill="hold">
                       <p:stCondLst>
                         <p:cond delay="indefinite"/>
                       </p:stCondLst>
                       <p:childTnLst>
                         <p:par>
-                          <p:cTn id="20" fill="hold">
+                          <p:cTn id="26" fill="hold">
                             <p:stCondLst>
                               <p:cond delay="0"/>
                             </p:stCondLst>
                             <p:childTnLst>
                               <p:par>
-                                <p:cTn id="21" presetID="1" presetClass="entr" presetSubtype="0" fill="hold" grpId="0" nodeType="clickEffect">
+                                <p:cTn id="27" presetID="1" presetClass="entr" presetSubtype="0" fill="hold" grpId="0" nodeType="clickEffect">
                                   <p:stCondLst>
                                     <p:cond delay="0"/>
                                   </p:stCondLst>
                                   <p:childTnLst>
                                     <p:set>
                                       <p:cBhvr>
-                                        <p:cTn id="22" dur="1" fill="hold">
-                                          <p:stCondLst>
-                                            <p:cond delay="0"/>
-                                          </p:stCondLst>
-                                        </p:cTn>
-                                        <p:tgtEl>
-                                          <p:spTgt spid="38"/>
-                                        </p:tgtEl>
-                                        <p:attrNameLst>
-                                          <p:attrName>style.visibility</p:attrName>
-                                        </p:attrNameLst>
-                                      </p:cBhvr>
-                                      <p:to>
-                                        <p:strVal val="visible"/>
-                                      </p:to>
-                                    </p:set>
-                                  </p:childTnLst>
-                                </p:cTn>
-                              </p:par>
-                              <p:par>
-                                <p:cTn id="23" presetID="1" presetClass="entr" presetSubtype="0" fill="hold" grpId="0" nodeType="withEffect">
-                                  <p:stCondLst>
-                                    <p:cond delay="0"/>
-                                  </p:stCondLst>
-                                  <p:childTnLst>
-                                    <p:set>
-                                      <p:cBhvr>
-                                        <p:cTn id="24" dur="1" fill="hold">
-                                          <p:stCondLst>
-                                            <p:cond delay="0"/>
-                                          </p:stCondLst>
-                                        </p:cTn>
-                                        <p:tgtEl>
-                                          <p:spTgt spid="39"/>
-                                        </p:tgtEl>
-                                        <p:attrNameLst>
-                                          <p:attrName>style.visibility</p:attrName>
-                                        </p:attrNameLst>
-                                      </p:cBhvr>
-                                      <p:to>
-                                        <p:strVal val="visible"/>
-                                      </p:to>
-                                    </p:set>
-                                  </p:childTnLst>
-                                </p:cTn>
-                              </p:par>
-                              <p:par>
-                                <p:cTn id="25" presetID="1" presetClass="entr" presetSubtype="0" fill="hold" nodeType="withEffect">
-                                  <p:stCondLst>
-                                    <p:cond delay="0"/>
-                                  </p:stCondLst>
-                                  <p:childTnLst>
-                                    <p:set>
-                                      <p:cBhvr>
-                                        <p:cTn id="26" dur="1" fill="hold">
-                                          <p:stCondLst>
-                                            <p:cond delay="0"/>
-                                          </p:stCondLst>
-                                        </p:cTn>
-                                        <p:tgtEl>
-                                          <p:spTgt spid="57"/>
-                                        </p:tgtEl>
-                                        <p:attrNameLst>
-                                          <p:attrName>style.visibility</p:attrName>
-                                        </p:attrNameLst>
-                                      </p:cBhvr>
-                                      <p:to>
-                                        <p:strVal val="visible"/>
-                                      </p:to>
-                                    </p:set>
-                                  </p:childTnLst>
-                                </p:cTn>
-                              </p:par>
-                            </p:childTnLst>
-                          </p:cTn>
-                        </p:par>
-                      </p:childTnLst>
-                    </p:cTn>
-                  </p:par>
-                  <p:par>
-                    <p:cTn id="27" fill="hold">
-                      <p:stCondLst>
-                        <p:cond delay="indefinite"/>
-                      </p:stCondLst>
-                      <p:childTnLst>
-                        <p:par>
-                          <p:cTn id="28" fill="hold">
-                            <p:stCondLst>
-                              <p:cond delay="0"/>
-                            </p:stCondLst>
-                            <p:childTnLst>
-                              <p:par>
-                                <p:cTn id="29" presetID="1" presetClass="entr" presetSubtype="0" fill="hold" grpId="0" nodeType="clickEffect">
-                                  <p:stCondLst>
-                                    <p:cond delay="0"/>
-                                  </p:stCondLst>
-                                  <p:childTnLst>
-                                    <p:set>
-                                      <p:cBhvr>
-                                        <p:cTn id="30" dur="1" fill="hold">
+                                        <p:cTn id="28" dur="1" fill="hold">
                                           <p:stCondLst>
                                             <p:cond delay="0"/>
                                           </p:stCondLst>
@@ -4782,14 +4764,14 @@
                                 </p:cTn>
                               </p:par>
                               <p:par>
-                                <p:cTn id="31" presetID="1" presetClass="entr" presetSubtype="0" fill="hold" nodeType="withEffect">
+                                <p:cTn id="29" presetID="1" presetClass="entr" presetSubtype="0" fill="hold" nodeType="withEffect">
                                   <p:stCondLst>
                                     <p:cond delay="0"/>
                                   </p:stCondLst>
                                   <p:childTnLst>
                                     <p:set>
                                       <p:cBhvr>
-                                        <p:cTn id="32" dur="1" fill="hold">
+                                        <p:cTn id="30" dur="1" fill="hold">
                                           <p:stCondLst>
                                             <p:cond delay="0"/>
                                           </p:stCondLst>
@@ -4815,26 +4797,26 @@
                     </p:cTn>
                   </p:par>
                   <p:par>
-                    <p:cTn id="33" fill="hold">
+                    <p:cTn id="31" fill="hold">
                       <p:stCondLst>
                         <p:cond delay="indefinite"/>
                       </p:stCondLst>
                       <p:childTnLst>
                         <p:par>
-                          <p:cTn id="34" fill="hold">
+                          <p:cTn id="32" fill="hold">
                             <p:stCondLst>
                               <p:cond delay="0"/>
                             </p:stCondLst>
                             <p:childTnLst>
                               <p:par>
-                                <p:cTn id="35" presetID="1" presetClass="entr" presetSubtype="0" fill="hold" nodeType="clickEffect">
+                                <p:cTn id="33" presetID="1" presetClass="entr" presetSubtype="0" fill="hold" nodeType="clickEffect">
                                   <p:stCondLst>
                                     <p:cond delay="0"/>
                                   </p:stCondLst>
                                   <p:childTnLst>
                                     <p:set>
                                       <p:cBhvr>
-                                        <p:cTn id="36" dur="1" fill="hold">
+                                        <p:cTn id="34" dur="1" fill="hold">
                                           <p:stCondLst>
                                             <p:cond delay="0"/>
                                           </p:stCondLst>
@@ -4854,7 +4836,34 @@
                                 </p:cTn>
                               </p:par>
                               <p:par>
-                                <p:cTn id="37" presetID="1" presetClass="entr" presetSubtype="0" fill="hold" nodeType="withEffect">
+                                <p:cTn id="35" presetID="1" presetClass="entr" presetSubtype="0" fill="hold" nodeType="withEffect">
+                                  <p:stCondLst>
+                                    <p:cond delay="0"/>
+                                  </p:stCondLst>
+                                  <p:childTnLst>
+                                    <p:set>
+                                      <p:cBhvr>
+                                        <p:cTn id="36" dur="1" fill="hold">
+                                          <p:stCondLst>
+                                            <p:cond delay="0"/>
+                                          </p:stCondLst>
+                                        </p:cTn>
+                                        <p:tgtEl>
+                                          <p:spTgt spid="89"/>
+                                        </p:tgtEl>
+                                        <p:attrNameLst>
+                                          <p:attrName>style.visibility</p:attrName>
+                                        </p:attrNameLst>
+                                      </p:cBhvr>
+                                      <p:to>
+                                        <p:strVal val="visible"/>
+                                      </p:to>
+                                    </p:set>
+                                  </p:childTnLst>
+                                </p:cTn>
+                              </p:par>
+                              <p:par>
+                                <p:cTn id="37" presetID="1" presetClass="entr" presetSubtype="0" fill="hold" grpId="0" nodeType="withEffect">
                                   <p:stCondLst>
                                     <p:cond delay="0"/>
                                   </p:stCondLst>
@@ -4867,7 +4876,7 @@
                                           </p:stCondLst>
                                         </p:cTn>
                                         <p:tgtEl>
-                                          <p:spTgt spid="89"/>
+                                          <p:spTgt spid="76"/>
                                         </p:tgtEl>
                                         <p:attrNameLst>
                                           <p:attrName>style.visibility</p:attrName>
@@ -4894,7 +4903,7 @@
                                           </p:stCondLst>
                                         </p:cTn>
                                         <p:tgtEl>
-                                          <p:spTgt spid="76"/>
+                                          <p:spTgt spid="51"/>
                                         </p:tgtEl>
                                         <p:attrNameLst>
                                           <p:attrName>style.visibility</p:attrName>
@@ -4921,7 +4930,7 @@
                                           </p:stCondLst>
                                         </p:cTn>
                                         <p:tgtEl>
-                                          <p:spTgt spid="51"/>
+                                          <p:spTgt spid="20"/>
                                         </p:tgtEl>
                                         <p:attrNameLst>
                                           <p:attrName>style.visibility</p:attrName>
@@ -4948,33 +4957,6 @@
                                           </p:stCondLst>
                                         </p:cTn>
                                         <p:tgtEl>
-                                          <p:spTgt spid="20"/>
-                                        </p:tgtEl>
-                                        <p:attrNameLst>
-                                          <p:attrName>style.visibility</p:attrName>
-                                        </p:attrNameLst>
-                                      </p:cBhvr>
-                                      <p:to>
-                                        <p:strVal val="visible"/>
-                                      </p:to>
-                                    </p:set>
-                                  </p:childTnLst>
-                                </p:cTn>
-                              </p:par>
-                              <p:par>
-                                <p:cTn id="45" presetID="1" presetClass="entr" presetSubtype="0" fill="hold" grpId="0" nodeType="withEffect">
-                                  <p:stCondLst>
-                                    <p:cond delay="0"/>
-                                  </p:stCondLst>
-                                  <p:childTnLst>
-                                    <p:set>
-                                      <p:cBhvr>
-                                        <p:cTn id="46" dur="1" fill="hold">
-                                          <p:stCondLst>
-                                            <p:cond delay="0"/>
-                                          </p:stCondLst>
-                                        </p:cTn>
-                                        <p:tgtEl>
                                           <p:spTgt spid="21"/>
                                         </p:tgtEl>
                                         <p:attrNameLst>
@@ -4995,26 +4977,26 @@
                     </p:cTn>
                   </p:par>
                   <p:par>
-                    <p:cTn id="47" fill="hold">
+                    <p:cTn id="45" fill="hold">
                       <p:stCondLst>
                         <p:cond delay="indefinite"/>
                       </p:stCondLst>
                       <p:childTnLst>
                         <p:par>
-                          <p:cTn id="48" fill="hold">
+                          <p:cTn id="46" fill="hold">
                             <p:stCondLst>
                               <p:cond delay="0"/>
                             </p:stCondLst>
                             <p:childTnLst>
                               <p:par>
-                                <p:cTn id="49" presetID="1" presetClass="entr" presetSubtype="0" fill="hold" grpId="0" nodeType="clickEffect">
+                                <p:cTn id="47" presetID="1" presetClass="entr" presetSubtype="0" fill="hold" grpId="0" nodeType="clickEffect">
                                   <p:stCondLst>
                                     <p:cond delay="0"/>
                                   </p:stCondLst>
                                   <p:childTnLst>
                                     <p:set>
                                       <p:cBhvr>
-                                        <p:cTn id="50" dur="1" fill="hold">
+                                        <p:cTn id="48" dur="1" fill="hold">
                                           <p:stCondLst>
                                             <p:cond delay="0"/>
                                           </p:stCondLst>
@@ -5040,26 +5022,26 @@
                     </p:cTn>
                   </p:par>
                   <p:par>
-                    <p:cTn id="51" fill="hold">
+                    <p:cTn id="49" fill="hold">
                       <p:stCondLst>
                         <p:cond delay="indefinite"/>
                       </p:stCondLst>
                       <p:childTnLst>
                         <p:par>
-                          <p:cTn id="52" fill="hold">
+                          <p:cTn id="50" fill="hold">
                             <p:stCondLst>
                               <p:cond delay="0"/>
                             </p:stCondLst>
                             <p:childTnLst>
                               <p:par>
-                                <p:cTn id="53" presetID="1" presetClass="entr" presetSubtype="0" fill="hold" grpId="0" nodeType="clickEffect">
+                                <p:cTn id="51" presetID="1" presetClass="entr" presetSubtype="0" fill="hold" grpId="0" nodeType="clickEffect">
                                   <p:stCondLst>
                                     <p:cond delay="0"/>
                                   </p:stCondLst>
                                   <p:childTnLst>
                                     <p:set>
                                       <p:cBhvr>
-                                        <p:cTn id="54" dur="1" fill="hold">
+                                        <p:cTn id="52" dur="1" fill="hold">
                                           <p:stCondLst>
                                             <p:cond delay="0"/>
                                           </p:stCondLst>
@@ -5079,14 +5061,14 @@
                                 </p:cTn>
                               </p:par>
                               <p:par>
-                                <p:cTn id="55" presetID="1" presetClass="entr" presetSubtype="0" fill="hold" grpId="0" nodeType="withEffect">
+                                <p:cTn id="53" presetID="1" presetClass="entr" presetSubtype="0" fill="hold" grpId="0" nodeType="withEffect">
                                   <p:stCondLst>
                                     <p:cond delay="0"/>
                                   </p:stCondLst>
                                   <p:childTnLst>
                                     <p:set>
                                       <p:cBhvr>
-                                        <p:cTn id="56" dur="1" fill="hold">
+                                        <p:cTn id="54" dur="1" fill="hold">
                                           <p:stCondLst>
                                             <p:cond delay="0"/>
                                           </p:stCondLst>
@@ -5112,26 +5094,26 @@
                     </p:cTn>
                   </p:par>
                   <p:par>
-                    <p:cTn id="57" fill="hold">
+                    <p:cTn id="55" fill="hold">
                       <p:stCondLst>
                         <p:cond delay="indefinite"/>
                       </p:stCondLst>
                       <p:childTnLst>
                         <p:par>
-                          <p:cTn id="58" fill="hold">
+                          <p:cTn id="56" fill="hold">
                             <p:stCondLst>
                               <p:cond delay="0"/>
                             </p:stCondLst>
                             <p:childTnLst>
                               <p:par>
-                                <p:cTn id="59" presetID="1" presetClass="entr" presetSubtype="0" fill="hold" grpId="0" nodeType="clickEffect">
+                                <p:cTn id="57" presetID="1" presetClass="entr" presetSubtype="0" fill="hold" grpId="0" nodeType="clickEffect">
                                   <p:stCondLst>
                                     <p:cond delay="0"/>
                                   </p:stCondLst>
                                   <p:childTnLst>
                                     <p:set>
                                       <p:cBhvr>
-                                        <p:cTn id="60" dur="1" fill="hold">
+                                        <p:cTn id="58" dur="1" fill="hold">
                                           <p:stCondLst>
                                             <p:cond delay="0"/>
                                           </p:stCondLst>
@@ -5151,14 +5133,14 @@
                                 </p:cTn>
                               </p:par>
                               <p:par>
-                                <p:cTn id="61" presetID="1" presetClass="entr" presetSubtype="0" fill="hold" nodeType="withEffect">
+                                <p:cTn id="59" presetID="1" presetClass="entr" presetSubtype="0" fill="hold" nodeType="withEffect">
                                   <p:stCondLst>
                                     <p:cond delay="0"/>
                                   </p:stCondLst>
                                   <p:childTnLst>
                                     <p:set>
                                       <p:cBhvr>
-                                        <p:cTn id="62" dur="1" fill="hold">
+                                        <p:cTn id="60" dur="1" fill="hold">
                                           <p:stCondLst>
                                             <p:cond delay="0"/>
                                           </p:stCondLst>
@@ -5184,26 +5166,26 @@
                     </p:cTn>
                   </p:par>
                   <p:par>
-                    <p:cTn id="63" fill="hold">
+                    <p:cTn id="61" fill="hold">
                       <p:stCondLst>
                         <p:cond delay="indefinite"/>
                       </p:stCondLst>
                       <p:childTnLst>
                         <p:par>
-                          <p:cTn id="64" fill="hold">
+                          <p:cTn id="62" fill="hold">
                             <p:stCondLst>
                               <p:cond delay="0"/>
                             </p:stCondLst>
                             <p:childTnLst>
                               <p:par>
-                                <p:cTn id="65" presetID="1" presetClass="entr" presetSubtype="0" fill="hold" nodeType="clickEffect">
+                                <p:cTn id="63" presetID="1" presetClass="entr" presetSubtype="0" fill="hold" nodeType="clickEffect">
                                   <p:stCondLst>
                                     <p:cond delay="0"/>
                                   </p:stCondLst>
                                   <p:childTnLst>
                                     <p:set>
                                       <p:cBhvr>
-                                        <p:cTn id="66" dur="1" fill="hold">
+                                        <p:cTn id="64" dur="1" fill="hold">
                                           <p:stCondLst>
                                             <p:cond delay="0"/>
                                           </p:stCondLst>
@@ -5229,26 +5211,26 @@
                     </p:cTn>
                   </p:par>
                   <p:par>
-                    <p:cTn id="67" fill="hold">
+                    <p:cTn id="65" fill="hold">
                       <p:stCondLst>
                         <p:cond delay="indefinite"/>
                       </p:stCondLst>
                       <p:childTnLst>
                         <p:par>
-                          <p:cTn id="68" fill="hold">
+                          <p:cTn id="66" fill="hold">
                             <p:stCondLst>
                               <p:cond delay="0"/>
                             </p:stCondLst>
                             <p:childTnLst>
                               <p:par>
-                                <p:cTn id="69" presetID="1" presetClass="entr" presetSubtype="0" fill="hold" nodeType="clickEffect">
+                                <p:cTn id="67" presetID="1" presetClass="entr" presetSubtype="0" fill="hold" nodeType="clickEffect">
                                   <p:stCondLst>
                                     <p:cond delay="0"/>
                                   </p:stCondLst>
                                   <p:childTnLst>
                                     <p:set>
                                       <p:cBhvr>
-                                        <p:cTn id="70" dur="1" fill="hold">
+                                        <p:cTn id="68" dur="1" fill="hold">
                                           <p:stCondLst>
                                             <p:cond delay="0"/>
                                           </p:stCondLst>
@@ -5268,14 +5250,14 @@
                                 </p:cTn>
                               </p:par>
                               <p:par>
-                                <p:cTn id="71" presetID="1" presetClass="entr" presetSubtype="0" fill="hold" nodeType="withEffect">
+                                <p:cTn id="69" presetID="1" presetClass="entr" presetSubtype="0" fill="hold" nodeType="withEffect">
                                   <p:stCondLst>
                                     <p:cond delay="0"/>
                                   </p:stCondLst>
                                   <p:childTnLst>
                                     <p:set>
                                       <p:cBhvr>
-                                        <p:cTn id="72" dur="1" fill="hold">
+                                        <p:cTn id="70" dur="1" fill="hold">
                                           <p:stCondLst>
                                             <p:cond delay="0"/>
                                           </p:stCondLst>
@@ -5301,19 +5283,46 @@
                     </p:cTn>
                   </p:par>
                   <p:par>
-                    <p:cTn id="73" fill="hold">
+                    <p:cTn id="71" fill="hold">
                       <p:stCondLst>
                         <p:cond delay="indefinite"/>
                       </p:stCondLst>
                       <p:childTnLst>
                         <p:par>
-                          <p:cTn id="74" fill="hold">
+                          <p:cTn id="72" fill="hold">
                             <p:stCondLst>
                               <p:cond delay="0"/>
                             </p:stCondLst>
                             <p:childTnLst>
                               <p:par>
-                                <p:cTn id="75" presetID="1" presetClass="entr" presetSubtype="0" fill="hold" nodeType="clickEffect">
+                                <p:cTn id="73" presetID="1" presetClass="entr" presetSubtype="0" fill="hold" nodeType="clickEffect">
+                                  <p:stCondLst>
+                                    <p:cond delay="0"/>
+                                  </p:stCondLst>
+                                  <p:childTnLst>
+                                    <p:set>
+                                      <p:cBhvr>
+                                        <p:cTn id="74" dur="1" fill="hold">
+                                          <p:stCondLst>
+                                            <p:cond delay="0"/>
+                                          </p:stCondLst>
+                                        </p:cTn>
+                                        <p:tgtEl>
+                                          <p:spTgt spid="85"/>
+                                        </p:tgtEl>
+                                        <p:attrNameLst>
+                                          <p:attrName>style.visibility</p:attrName>
+                                        </p:attrNameLst>
+                                      </p:cBhvr>
+                                      <p:to>
+                                        <p:strVal val="visible"/>
+                                      </p:to>
+                                    </p:set>
+                                  </p:childTnLst>
+                                </p:cTn>
+                              </p:par>
+                              <p:par>
+                                <p:cTn id="75" presetID="1" presetClass="entr" presetSubtype="0" fill="hold" grpId="0" nodeType="withEffect">
                                   <p:stCondLst>
                                     <p:cond delay="0"/>
                                   </p:stCondLst>
@@ -5326,7 +5335,7 @@
                                           </p:stCondLst>
                                         </p:cTn>
                                         <p:tgtEl>
-                                          <p:spTgt spid="85"/>
+                                          <p:spTgt spid="83"/>
                                         </p:tgtEl>
                                         <p:attrNameLst>
                                           <p:attrName>style.visibility</p:attrName>
@@ -5353,33 +5362,6 @@
                                           </p:stCondLst>
                                         </p:cTn>
                                         <p:tgtEl>
-                                          <p:spTgt spid="83"/>
-                                        </p:tgtEl>
-                                        <p:attrNameLst>
-                                          <p:attrName>style.visibility</p:attrName>
-                                        </p:attrNameLst>
-                                      </p:cBhvr>
-                                      <p:to>
-                                        <p:strVal val="visible"/>
-                                      </p:to>
-                                    </p:set>
-                                  </p:childTnLst>
-                                </p:cTn>
-                              </p:par>
-                              <p:par>
-                                <p:cTn id="79" presetID="1" presetClass="entr" presetSubtype="0" fill="hold" grpId="0" nodeType="withEffect">
-                                  <p:stCondLst>
-                                    <p:cond delay="0"/>
-                                  </p:stCondLst>
-                                  <p:childTnLst>
-                                    <p:set>
-                                      <p:cBhvr>
-                                        <p:cTn id="80" dur="1" fill="hold">
-                                          <p:stCondLst>
-                                            <p:cond delay="0"/>
-                                          </p:stCondLst>
-                                        </p:cTn>
-                                        <p:tgtEl>
                                           <p:spTgt spid="84"/>
                                         </p:tgtEl>
                                         <p:attrNameLst>
@@ -5400,19 +5382,46 @@
                     </p:cTn>
                   </p:par>
                   <p:par>
-                    <p:cTn id="81" fill="hold">
+                    <p:cTn id="79" fill="hold">
                       <p:stCondLst>
                         <p:cond delay="indefinite"/>
                       </p:stCondLst>
                       <p:childTnLst>
                         <p:par>
-                          <p:cTn id="82" fill="hold">
+                          <p:cTn id="80" fill="hold">
                             <p:stCondLst>
                               <p:cond delay="0"/>
                             </p:stCondLst>
                             <p:childTnLst>
                               <p:par>
-                                <p:cTn id="83" presetID="1" presetClass="entr" presetSubtype="0" fill="hold" grpId="0" nodeType="clickEffect">
+                                <p:cTn id="81" presetID="1" presetClass="entr" presetSubtype="0" fill="hold" grpId="0" nodeType="clickEffect">
+                                  <p:stCondLst>
+                                    <p:cond delay="0"/>
+                                  </p:stCondLst>
+                                  <p:childTnLst>
+                                    <p:set>
+                                      <p:cBhvr>
+                                        <p:cTn id="82" dur="1" fill="hold">
+                                          <p:stCondLst>
+                                            <p:cond delay="0"/>
+                                          </p:stCondLst>
+                                        </p:cTn>
+                                        <p:tgtEl>
+                                          <p:spTgt spid="93"/>
+                                        </p:tgtEl>
+                                        <p:attrNameLst>
+                                          <p:attrName>style.visibility</p:attrName>
+                                        </p:attrNameLst>
+                                      </p:cBhvr>
+                                      <p:to>
+                                        <p:strVal val="visible"/>
+                                      </p:to>
+                                    </p:set>
+                                  </p:childTnLst>
+                                </p:cTn>
+                              </p:par>
+                              <p:par>
+                                <p:cTn id="83" presetID="1" presetClass="entr" presetSubtype="0" fill="hold" nodeType="withEffect">
                                   <p:stCondLst>
                                     <p:cond delay="0"/>
                                   </p:stCondLst>
@@ -5425,7 +5434,7 @@
                                           </p:stCondLst>
                                         </p:cTn>
                                         <p:tgtEl>
-                                          <p:spTgt spid="93"/>
+                                          <p:spTgt spid="5"/>
                                         </p:tgtEl>
                                         <p:attrNameLst>
                                           <p:attrName>style.visibility</p:attrName>
@@ -5452,33 +5461,6 @@
                                           </p:stCondLst>
                                         </p:cTn>
                                         <p:tgtEl>
-                                          <p:spTgt spid="5"/>
-                                        </p:tgtEl>
-                                        <p:attrNameLst>
-                                          <p:attrName>style.visibility</p:attrName>
-                                        </p:attrNameLst>
-                                      </p:cBhvr>
-                                      <p:to>
-                                        <p:strVal val="visible"/>
-                                      </p:to>
-                                    </p:set>
-                                  </p:childTnLst>
-                                </p:cTn>
-                              </p:par>
-                              <p:par>
-                                <p:cTn id="87" presetID="1" presetClass="entr" presetSubtype="0" fill="hold" nodeType="withEffect">
-                                  <p:stCondLst>
-                                    <p:cond delay="0"/>
-                                  </p:stCondLst>
-                                  <p:childTnLst>
-                                    <p:set>
-                                      <p:cBhvr>
-                                        <p:cTn id="88" dur="1" fill="hold">
-                                          <p:stCondLst>
-                                            <p:cond delay="0"/>
-                                          </p:stCondLst>
-                                        </p:cTn>
-                                        <p:tgtEl>
                                           <p:spTgt spid="88"/>
                                         </p:tgtEl>
                                         <p:attrNameLst>
@@ -5493,14 +5475,14 @@
                                 </p:cTn>
                               </p:par>
                               <p:par>
-                                <p:cTn id="89" presetID="1" presetClass="entr" presetSubtype="0" fill="hold" grpId="0" nodeType="withEffect">
+                                <p:cTn id="87" presetID="1" presetClass="entr" presetSubtype="0" fill="hold" grpId="0" nodeType="withEffect">
                                   <p:stCondLst>
                                     <p:cond delay="0"/>
                                   </p:stCondLst>
                                   <p:childTnLst>
                                     <p:set>
                                       <p:cBhvr>
-                                        <p:cTn id="90" dur="1" fill="hold">
+                                        <p:cTn id="88" dur="1" fill="hold">
                                           <p:stCondLst>
                                             <p:cond delay="0"/>
                                           </p:stCondLst>
@@ -5526,26 +5508,26 @@
                     </p:cTn>
                   </p:par>
                   <p:par>
-                    <p:cTn id="91" fill="hold">
+                    <p:cTn id="89" fill="hold">
                       <p:stCondLst>
                         <p:cond delay="indefinite"/>
                       </p:stCondLst>
                       <p:childTnLst>
                         <p:par>
-                          <p:cTn id="92" fill="hold">
+                          <p:cTn id="90" fill="hold">
                             <p:stCondLst>
                               <p:cond delay="0"/>
                             </p:stCondLst>
                             <p:childTnLst>
                               <p:par>
-                                <p:cTn id="93" presetID="1" presetClass="entr" presetSubtype="0" fill="hold" grpId="0" nodeType="clickEffect">
+                                <p:cTn id="91" presetID="1" presetClass="entr" presetSubtype="0" fill="hold" grpId="0" nodeType="clickEffect">
                                   <p:stCondLst>
                                     <p:cond delay="0"/>
                                   </p:stCondLst>
                                   <p:childTnLst>
                                     <p:set>
                                       <p:cBhvr>
-                                        <p:cTn id="94" dur="1" fill="hold">
+                                        <p:cTn id="92" dur="1" fill="hold">
                                           <p:stCondLst>
                                             <p:cond delay="0"/>
                                           </p:stCondLst>
@@ -5565,14 +5547,14 @@
                                 </p:cTn>
                               </p:par>
                               <p:par>
-                                <p:cTn id="95" presetID="1" presetClass="entr" presetSubtype="0" fill="hold" grpId="0" nodeType="withEffect">
+                                <p:cTn id="93" presetID="1" presetClass="entr" presetSubtype="0" fill="hold" grpId="0" nodeType="withEffect">
                                   <p:stCondLst>
                                     <p:cond delay="0"/>
                                   </p:stCondLst>
                                   <p:childTnLst>
                                     <p:set>
                                       <p:cBhvr>
-                                        <p:cTn id="96" dur="1" fill="hold">
+                                        <p:cTn id="94" dur="1" fill="hold">
                                           <p:stCondLst>
                                             <p:cond delay="0"/>
                                           </p:stCondLst>
@@ -5592,14 +5574,14 @@
                                 </p:cTn>
                               </p:par>
                               <p:par>
-                                <p:cTn id="97" presetID="1" presetClass="entr" presetSubtype="0" fill="hold" nodeType="withEffect">
+                                <p:cTn id="95" presetID="1" presetClass="entr" presetSubtype="0" fill="hold" nodeType="withEffect">
                                   <p:stCondLst>
                                     <p:cond delay="0"/>
                                   </p:stCondLst>
                                   <p:childTnLst>
                                     <p:set>
                                       <p:cBhvr>
-                                        <p:cTn id="98" dur="1" fill="hold">
+                                        <p:cTn id="96" dur="1" fill="hold">
                                           <p:stCondLst>
                                             <p:cond delay="0"/>
                                           </p:stCondLst>
@@ -5625,26 +5607,26 @@
                     </p:cTn>
                   </p:par>
                   <p:par>
-                    <p:cTn id="99" fill="hold">
+                    <p:cTn id="97" fill="hold">
                       <p:stCondLst>
                         <p:cond delay="indefinite"/>
                       </p:stCondLst>
                       <p:childTnLst>
                         <p:par>
-                          <p:cTn id="100" fill="hold">
+                          <p:cTn id="98" fill="hold">
                             <p:stCondLst>
                               <p:cond delay="0"/>
                             </p:stCondLst>
                             <p:childTnLst>
                               <p:par>
-                                <p:cTn id="101" presetID="1" presetClass="entr" presetSubtype="0" fill="hold" grpId="0" nodeType="clickEffect">
+                                <p:cTn id="99" presetID="1" presetClass="entr" presetSubtype="0" fill="hold" grpId="0" nodeType="clickEffect">
                                   <p:stCondLst>
                                     <p:cond delay="0"/>
                                   </p:stCondLst>
                                   <p:childTnLst>
                                     <p:set>
                                       <p:cBhvr>
-                                        <p:cTn id="102" dur="1" fill="hold">
+                                        <p:cTn id="100" dur="1" fill="hold">
                                           <p:stCondLst>
                                             <p:cond delay="0"/>
                                           </p:stCondLst>
@@ -5664,14 +5646,14 @@
                                 </p:cTn>
                               </p:par>
                               <p:par>
-                                <p:cTn id="103" presetID="1" presetClass="entr" presetSubtype="0" fill="hold" nodeType="withEffect">
+                                <p:cTn id="101" presetID="1" presetClass="entr" presetSubtype="0" fill="hold" nodeType="withEffect">
                                   <p:stCondLst>
                                     <p:cond delay="0"/>
                                   </p:stCondLst>
                                   <p:childTnLst>
                                     <p:set>
                                       <p:cBhvr>
-                                        <p:cTn id="104" dur="1" fill="hold">
+                                        <p:cTn id="102" dur="1" fill="hold">
                                           <p:stCondLst>
                                             <p:cond delay="0"/>
                                           </p:stCondLst>
@@ -5697,26 +5679,26 @@
                     </p:cTn>
                   </p:par>
                   <p:par>
-                    <p:cTn id="105" fill="hold">
+                    <p:cTn id="103" fill="hold">
                       <p:stCondLst>
                         <p:cond delay="indefinite"/>
                       </p:stCondLst>
                       <p:childTnLst>
                         <p:par>
-                          <p:cTn id="106" fill="hold">
+                          <p:cTn id="104" fill="hold">
                             <p:stCondLst>
                               <p:cond delay="0"/>
                             </p:stCondLst>
                             <p:childTnLst>
                               <p:par>
-                                <p:cTn id="107" presetID="1" presetClass="entr" presetSubtype="0" fill="hold" nodeType="clickEffect">
+                                <p:cTn id="105" presetID="1" presetClass="entr" presetSubtype="0" fill="hold" nodeType="clickEffect">
                                   <p:stCondLst>
                                     <p:cond delay="0"/>
                                   </p:stCondLst>
                                   <p:childTnLst>
                                     <p:set>
                                       <p:cBhvr>
-                                        <p:cTn id="108" dur="1" fill="hold">
+                                        <p:cTn id="106" dur="1" fill="hold">
                                           <p:stCondLst>
                                             <p:cond delay="0"/>
                                           </p:stCondLst>
@@ -5742,26 +5724,26 @@
                     </p:cTn>
                   </p:par>
                   <p:par>
-                    <p:cTn id="109" fill="hold">
+                    <p:cTn id="107" fill="hold">
                       <p:stCondLst>
                         <p:cond delay="indefinite"/>
                       </p:stCondLst>
                       <p:childTnLst>
                         <p:par>
-                          <p:cTn id="110" fill="hold">
+                          <p:cTn id="108" fill="hold">
                             <p:stCondLst>
                               <p:cond delay="0"/>
                             </p:stCondLst>
                             <p:childTnLst>
                               <p:par>
-                                <p:cTn id="111" presetID="1" presetClass="entr" presetSubtype="0" fill="hold" nodeType="clickEffect">
+                                <p:cTn id="109" presetID="1" presetClass="entr" presetSubtype="0" fill="hold" nodeType="clickEffect">
                                   <p:stCondLst>
                                     <p:cond delay="0"/>
                                   </p:stCondLst>
                                   <p:childTnLst>
                                     <p:set>
                                       <p:cBhvr>
-                                        <p:cTn id="112" dur="1" fill="hold">
+                                        <p:cTn id="110" dur="1" fill="hold">
                                           <p:stCondLst>
                                             <p:cond delay="0"/>
                                           </p:stCondLst>
@@ -5780,8 +5762,26 @@
                                   </p:childTnLst>
                                 </p:cTn>
                               </p:par>
+                            </p:childTnLst>
+                          </p:cTn>
+                        </p:par>
+                      </p:childTnLst>
+                    </p:cTn>
+                  </p:par>
+                  <p:par>
+                    <p:cTn id="111" fill="hold">
+                      <p:stCondLst>
+                        <p:cond delay="indefinite"/>
+                      </p:stCondLst>
+                      <p:childTnLst>
+                        <p:par>
+                          <p:cTn id="112" fill="hold">
+                            <p:stCondLst>
+                              <p:cond delay="0"/>
+                            </p:stCondLst>
+                            <p:childTnLst>
                               <p:par>
-                                <p:cTn id="113" presetID="1" presetClass="entr" presetSubtype="0" fill="hold" nodeType="withEffect">
+                                <p:cTn id="113" presetID="1" presetClass="entr" presetSubtype="0" fill="hold" nodeType="clickEffect">
                                   <p:stCondLst>
                                     <p:cond delay="0"/>
                                   </p:stCondLst>

</xml_diff>

<commit_message>
Add illustration for IoT
</commit_message>
<xml_diff>
--- a/fig/aws-iot-components-v01.pptx
+++ b/fig/aws-iot-components-v01.pptx
@@ -7349,7 +7349,7 @@
         </p:nvSpPr>
         <p:spPr>
           <a:xfrm>
-            <a:off x="1151286" y="4485717"/>
+            <a:off x="1151286" y="3717061"/>
             <a:ext cx="851515" cy="307777"/>
           </a:xfrm>
           <a:prstGeom prst="rect">
@@ -7379,7 +7379,7 @@
         </p:nvSpPr>
         <p:spPr>
           <a:xfrm>
-            <a:off x="1215245" y="3751938"/>
+            <a:off x="1215245" y="2983282"/>
             <a:ext cx="713632" cy="523220"/>
           </a:xfrm>
           <a:prstGeom prst="rect">
@@ -7416,7 +7416,7 @@
         </p:nvSpPr>
         <p:spPr>
           <a:xfrm>
-            <a:off x="1644692" y="4251133"/>
+            <a:off x="1644692" y="3482477"/>
             <a:ext cx="891503" cy="307777"/>
           </a:xfrm>
           <a:prstGeom prst="rect">
@@ -7446,7 +7446,7 @@
         </p:nvSpPr>
         <p:spPr>
           <a:xfrm>
-            <a:off x="3060300" y="3380696"/>
+            <a:off x="3282302" y="2663113"/>
             <a:ext cx="703638" cy="523220"/>
           </a:xfrm>
           <a:prstGeom prst="rect">
@@ -7487,7 +7487,7 @@
         </p:nvCxnSpPr>
         <p:spPr>
           <a:xfrm flipH="1" flipV="1">
-            <a:off x="1572061" y="4275158"/>
+            <a:off x="1572061" y="3506502"/>
             <a:ext cx="4983" cy="210559"/>
           </a:xfrm>
           <a:prstGeom prst="straightConnector1">
@@ -7523,7 +7523,7 @@
         </p:nvSpPr>
         <p:spPr>
           <a:xfrm>
-            <a:off x="4146266" y="4485717"/>
+            <a:off x="4146266" y="3717061"/>
             <a:ext cx="671979" cy="307777"/>
           </a:xfrm>
           <a:prstGeom prst="rect">
@@ -7553,7 +7553,7 @@
         </p:nvSpPr>
         <p:spPr>
           <a:xfrm>
-            <a:off x="7303676" y="3482419"/>
+            <a:off x="7303676" y="2713763"/>
             <a:ext cx="671904" cy="307777"/>
           </a:xfrm>
           <a:prstGeom prst="rect">
@@ -7586,8 +7586,8 @@
         </p:nvCxnSpPr>
         <p:spPr>
           <a:xfrm flipH="1" flipV="1">
-            <a:off x="3412119" y="3903916"/>
-            <a:ext cx="1070137" cy="581801"/>
+            <a:off x="3634121" y="3186333"/>
+            <a:ext cx="848135" cy="530728"/>
           </a:xfrm>
           <a:prstGeom prst="straightConnector1">
             <a:avLst/>
@@ -7624,7 +7624,7 @@
         </p:nvCxnSpPr>
         <p:spPr>
           <a:xfrm flipV="1">
-            <a:off x="2002801" y="4626196"/>
+            <a:off x="2002801" y="3857540"/>
             <a:ext cx="714379" cy="13410"/>
           </a:xfrm>
           <a:prstGeom prst="straightConnector1">
@@ -7660,7 +7660,7 @@
         </p:nvSpPr>
         <p:spPr>
           <a:xfrm>
-            <a:off x="4722370" y="4558852"/>
+            <a:off x="4722370" y="3790196"/>
             <a:ext cx="721785" cy="307777"/>
           </a:xfrm>
           <a:prstGeom prst="rect">
@@ -7690,7 +7690,7 @@
         </p:nvSpPr>
         <p:spPr>
           <a:xfrm>
-            <a:off x="5109141" y="3879842"/>
+            <a:off x="5109141" y="3111186"/>
             <a:ext cx="563726" cy="523220"/>
           </a:xfrm>
           <a:prstGeom prst="rect">
@@ -7731,7 +7731,7 @@
         </p:nvCxnSpPr>
         <p:spPr>
           <a:xfrm flipV="1">
-            <a:off x="4818245" y="4403062"/>
+            <a:off x="4818245" y="3634406"/>
             <a:ext cx="572759" cy="236544"/>
           </a:xfrm>
           <a:prstGeom prst="bentConnector2">
@@ -7767,7 +7767,7 @@
         </p:nvSpPr>
         <p:spPr>
           <a:xfrm>
-            <a:off x="2826824" y="4364585"/>
+            <a:off x="2826824" y="3595929"/>
             <a:ext cx="793406" cy="523220"/>
           </a:xfrm>
           <a:prstGeom prst="rect">
@@ -7808,7 +7808,7 @@
         </p:nvCxnSpPr>
         <p:spPr>
           <a:xfrm flipH="1" flipV="1">
-            <a:off x="3620230" y="4626195"/>
+            <a:off x="3620230" y="3857539"/>
             <a:ext cx="526036" cy="13411"/>
           </a:xfrm>
           <a:prstGeom prst="straightConnector1">
@@ -7847,7 +7847,7 @@
         </p:nvCxnSpPr>
         <p:spPr>
           <a:xfrm flipV="1">
-            <a:off x="4818245" y="4403062"/>
+            <a:off x="4818245" y="3634406"/>
             <a:ext cx="1514520" cy="236544"/>
           </a:xfrm>
           <a:prstGeom prst="bentConnector2">
@@ -7883,7 +7883,7 @@
         </p:nvSpPr>
         <p:spPr>
           <a:xfrm>
-            <a:off x="5841253" y="3879842"/>
+            <a:off x="5841253" y="3111186"/>
             <a:ext cx="983024" cy="523220"/>
           </a:xfrm>
           <a:prstGeom prst="rect">
@@ -7924,7 +7924,7 @@
         </p:nvCxnSpPr>
         <p:spPr>
           <a:xfrm flipV="1">
-            <a:off x="4818245" y="4403062"/>
+            <a:off x="4818245" y="3634406"/>
             <a:ext cx="2485431" cy="236544"/>
           </a:xfrm>
           <a:prstGeom prst="bentConnector2">
@@ -7960,7 +7960,7 @@
         </p:nvSpPr>
         <p:spPr>
           <a:xfrm>
-            <a:off x="7016772" y="3879842"/>
+            <a:off x="7016772" y="3111186"/>
             <a:ext cx="573807" cy="523220"/>
           </a:xfrm>
           <a:prstGeom prst="rect">
@@ -7998,7 +7998,7 @@
         </p:nvSpPr>
         <p:spPr>
           <a:xfrm>
-            <a:off x="5712397" y="3341287"/>
+            <a:off x="5712397" y="2572631"/>
             <a:ext cx="620683" cy="307777"/>
           </a:xfrm>
           <a:prstGeom prst="rect">
@@ -8029,7 +8029,7 @@
         </p:nvSpPr>
         <p:spPr>
           <a:xfrm>
-            <a:off x="6981266" y="3258252"/>
+            <a:off x="6981266" y="2489596"/>
             <a:ext cx="620683" cy="307777"/>
           </a:xfrm>
           <a:prstGeom prst="rect">
@@ -8063,7 +8063,7 @@
         </p:nvCxnSpPr>
         <p:spPr>
           <a:xfrm>
-            <a:off x="7291608" y="3566029"/>
+            <a:off x="7291608" y="2797373"/>
             <a:ext cx="12068" cy="313813"/>
           </a:xfrm>
           <a:prstGeom prst="straightConnector1">
@@ -8102,7 +8102,7 @@
         </p:nvCxnSpPr>
         <p:spPr>
           <a:xfrm flipH="1">
-            <a:off x="5391004" y="3649064"/>
+            <a:off x="5391004" y="2880408"/>
             <a:ext cx="631735" cy="230778"/>
           </a:xfrm>
           <a:prstGeom prst="straightConnector1">
@@ -8141,8 +8141,8 @@
         </p:nvCxnSpPr>
         <p:spPr>
           <a:xfrm flipH="1" flipV="1">
-            <a:off x="2905616" y="3324047"/>
-            <a:ext cx="506503" cy="56649"/>
+            <a:off x="2905616" y="2555391"/>
+            <a:ext cx="728505" cy="107722"/>
           </a:xfrm>
           <a:prstGeom prst="straightConnector1">
             <a:avLst/>
@@ -8177,7 +8177,7 @@
         </p:nvSpPr>
         <p:spPr>
           <a:xfrm>
-            <a:off x="5809517" y="2958581"/>
+            <a:off x="5809517" y="2189925"/>
             <a:ext cx="661822" cy="307777"/>
           </a:xfrm>
           <a:prstGeom prst="rect">
@@ -8207,7 +8207,7 @@
         </p:nvSpPr>
         <p:spPr>
           <a:xfrm>
-            <a:off x="1978365" y="2954715"/>
+            <a:off x="1978365" y="2186059"/>
             <a:ext cx="927251" cy="738664"/>
           </a:xfrm>
           <a:prstGeom prst="rect">
@@ -8239,9 +8239,9 @@
           <p:nvPr/>
         </p:nvCxnSpPr>
         <p:spPr>
-          <a:xfrm flipV="1">
-            <a:off x="3412119" y="2902774"/>
-            <a:ext cx="174776" cy="477922"/>
+          <a:xfrm flipH="1" flipV="1">
+            <a:off x="3586895" y="2134118"/>
+            <a:ext cx="47226" cy="528995"/>
           </a:xfrm>
           <a:prstGeom prst="straightConnector1">
             <a:avLst/>
@@ -8276,7 +8276,7 @@
         </p:nvSpPr>
         <p:spPr>
           <a:xfrm>
-            <a:off x="3519152" y="4626195"/>
+            <a:off x="3519152" y="3857539"/>
             <a:ext cx="721785" cy="307777"/>
           </a:xfrm>
           <a:prstGeom prst="rect">
@@ -8306,7 +8306,7 @@
         </p:nvSpPr>
         <p:spPr>
           <a:xfrm>
-            <a:off x="2814246" y="3065366"/>
+            <a:off x="2814246" y="2296710"/>
             <a:ext cx="1230851" cy="307777"/>
           </a:xfrm>
           <a:prstGeom prst="rect">
@@ -8336,7 +8336,7 @@
         </p:nvSpPr>
         <p:spPr>
           <a:xfrm>
-            <a:off x="3060300" y="2594997"/>
+            <a:off x="3060300" y="1826341"/>
             <a:ext cx="1053190" cy="307777"/>
           </a:xfrm>
           <a:prstGeom prst="rect">
@@ -8366,7 +8366,7 @@
         </p:nvSpPr>
         <p:spPr>
           <a:xfrm>
-            <a:off x="2832562" y="2362665"/>
+            <a:off x="2832562" y="1594009"/>
             <a:ext cx="801559" cy="307777"/>
           </a:xfrm>
           <a:prstGeom prst="rect">
@@ -8399,7 +8399,7 @@
         </p:nvCxnSpPr>
         <p:spPr>
           <a:xfrm flipV="1">
-            <a:off x="3586895" y="2148743"/>
+            <a:off x="3586895" y="1380087"/>
             <a:ext cx="146832" cy="446254"/>
           </a:xfrm>
           <a:prstGeom prst="straightConnector1">
@@ -8435,7 +8435,7 @@
         </p:nvSpPr>
         <p:spPr>
           <a:xfrm>
-            <a:off x="3207132" y="1840966"/>
+            <a:off x="3207132" y="1072310"/>
             <a:ext cx="1053190" cy="307777"/>
           </a:xfrm>
           <a:prstGeom prst="rect">
@@ -8465,7 +8465,7 @@
         </p:nvSpPr>
         <p:spPr>
           <a:xfrm>
-            <a:off x="3627832" y="2226384"/>
+            <a:off x="3627832" y="1457728"/>
             <a:ext cx="613105" cy="307777"/>
           </a:xfrm>
           <a:prstGeom prst="rect">
@@ -8498,7 +8498,7 @@
         </p:nvCxnSpPr>
         <p:spPr>
           <a:xfrm flipH="1" flipV="1">
-            <a:off x="3733727" y="2148743"/>
+            <a:off x="3733727" y="1380087"/>
             <a:ext cx="200658" cy="77641"/>
           </a:xfrm>
           <a:prstGeom prst="straightConnector1">
@@ -8537,7 +8537,7 @@
         </p:nvCxnSpPr>
         <p:spPr>
           <a:xfrm flipV="1">
-            <a:off x="3586895" y="2534161"/>
+            <a:off x="3586895" y="1765505"/>
             <a:ext cx="347490" cy="60836"/>
           </a:xfrm>
           <a:prstGeom prst="straightConnector1">
@@ -8576,7 +8576,7 @@
         </p:nvCxnSpPr>
         <p:spPr>
           <a:xfrm flipV="1">
-            <a:off x="6022739" y="1830891"/>
+            <a:off x="6022739" y="1062235"/>
             <a:ext cx="1068243" cy="1510396"/>
           </a:xfrm>
           <a:prstGeom prst="straightConnector1">
@@ -8612,7 +8612,7 @@
         </p:nvSpPr>
         <p:spPr>
           <a:xfrm>
-            <a:off x="7090982" y="1677002"/>
+            <a:off x="7090982" y="908346"/>
             <a:ext cx="1053190" cy="307777"/>
           </a:xfrm>
           <a:prstGeom prst="rect">
@@ -8642,7 +8642,7 @@
         </p:nvSpPr>
         <p:spPr>
           <a:xfrm>
-            <a:off x="1509080" y="2355331"/>
+            <a:off x="1509080" y="1586675"/>
             <a:ext cx="1056700" cy="307777"/>
           </a:xfrm>
           <a:prstGeom prst="rect">
@@ -8675,7 +8675,7 @@
         </p:nvCxnSpPr>
         <p:spPr>
           <a:xfrm flipH="1" flipV="1">
-            <a:off x="6022738" y="2394049"/>
+            <a:off x="6022738" y="1625393"/>
             <a:ext cx="1" cy="947238"/>
           </a:xfrm>
           <a:prstGeom prst="straightConnector1">
@@ -8711,7 +8711,7 @@
         </p:nvSpPr>
         <p:spPr>
           <a:xfrm>
-            <a:off x="5629566" y="1870829"/>
+            <a:off x="5629566" y="1102173"/>
             <a:ext cx="786343" cy="523220"/>
           </a:xfrm>
           <a:prstGeom prst="rect">
@@ -8752,7 +8752,7 @@
         </p:nvCxnSpPr>
         <p:spPr>
           <a:xfrm flipH="1" flipV="1">
-            <a:off x="5512534" y="3039774"/>
+            <a:off x="5512534" y="2271118"/>
             <a:ext cx="510205" cy="301513"/>
           </a:xfrm>
           <a:prstGeom prst="straightConnector1">
@@ -8791,7 +8791,7 @@
         </p:nvCxnSpPr>
         <p:spPr>
           <a:xfrm flipV="1">
-            <a:off x="6022739" y="1325809"/>
+            <a:off x="6022739" y="557153"/>
             <a:ext cx="796109" cy="2015478"/>
           </a:xfrm>
           <a:prstGeom prst="straightConnector1">
@@ -8827,7 +8827,7 @@
         </p:nvSpPr>
         <p:spPr>
           <a:xfrm>
-            <a:off x="5740223" y="1018032"/>
+            <a:off x="5740223" y="249376"/>
             <a:ext cx="2157250" cy="307777"/>
           </a:xfrm>
           <a:prstGeom prst="rect">
@@ -8860,7 +8860,7 @@
         </p:nvCxnSpPr>
         <p:spPr>
           <a:xfrm rot="10800000" flipH="1">
-            <a:off x="1151285" y="1171922"/>
+            <a:off x="1151285" y="403266"/>
             <a:ext cx="4588937" cy="3467685"/>
           </a:xfrm>
           <a:prstGeom prst="bentConnector3">
@@ -8901,7 +8901,7 @@
         </p:nvCxnSpPr>
         <p:spPr>
           <a:xfrm rot="5400000" flipH="1" flipV="1">
-            <a:off x="4262179" y="1743192"/>
+            <a:off x="4262179" y="974536"/>
             <a:ext cx="2962603" cy="2522448"/>
           </a:xfrm>
           <a:prstGeom prst="bentConnector2">
@@ -8937,7 +8937,7 @@
         </p:nvSpPr>
         <p:spPr>
           <a:xfrm>
-            <a:off x="7423182" y="2338122"/>
+            <a:off x="7423182" y="1569466"/>
             <a:ext cx="1081120" cy="307777"/>
           </a:xfrm>
           <a:prstGeom prst="rect">
@@ -8967,7 +8967,7 @@
         </p:nvSpPr>
         <p:spPr>
           <a:xfrm>
-            <a:off x="7004704" y="1369225"/>
+            <a:off x="7004704" y="600569"/>
             <a:ext cx="1123542" cy="307777"/>
           </a:xfrm>
           <a:prstGeom prst="rect">
@@ -9000,7 +9000,7 @@
         </p:nvCxnSpPr>
         <p:spPr>
           <a:xfrm flipV="1">
-            <a:off x="6022739" y="1523114"/>
+            <a:off x="6022739" y="754458"/>
             <a:ext cx="981965" cy="1818173"/>
           </a:xfrm>
           <a:prstGeom prst="straightConnector1">
@@ -9038,7 +9038,7 @@
         </p:nvCxnSpPr>
         <p:spPr>
           <a:xfrm rot="5400000" flipH="1" flipV="1">
-            <a:off x="3546988" y="2292483"/>
+            <a:off x="3546988" y="1523827"/>
             <a:ext cx="3313796" cy="1072673"/>
           </a:xfrm>
           <a:prstGeom prst="bentConnector2">
@@ -9077,7 +9077,7 @@
         </p:nvCxnSpPr>
         <p:spPr>
           <a:xfrm flipV="1">
-            <a:off x="6333080" y="2710918"/>
+            <a:off x="6333080" y="1942262"/>
             <a:ext cx="653435" cy="784258"/>
           </a:xfrm>
           <a:prstGeom prst="straightConnector1">
@@ -9113,7 +9113,7 @@
         </p:nvSpPr>
         <p:spPr>
           <a:xfrm>
-            <a:off x="6986515" y="2557029"/>
+            <a:off x="6986515" y="1788373"/>
             <a:ext cx="1053190" cy="307777"/>
           </a:xfrm>
           <a:prstGeom prst="rect">
@@ -9146,7 +9146,7 @@
         </p:nvCxnSpPr>
         <p:spPr>
           <a:xfrm flipV="1">
-            <a:off x="6022739" y="2137179"/>
+            <a:off x="6022739" y="1368523"/>
             <a:ext cx="1184826" cy="1204108"/>
           </a:xfrm>
           <a:prstGeom prst="straightConnector1">
@@ -9182,7 +9182,7 @@
         </p:nvSpPr>
         <p:spPr>
           <a:xfrm>
-            <a:off x="7207565" y="1983290"/>
+            <a:off x="7207565" y="1214634"/>
             <a:ext cx="1353941" cy="307777"/>
           </a:xfrm>
           <a:prstGeom prst="rect">
@@ -9215,7 +9215,7 @@
         </p:nvCxnSpPr>
         <p:spPr>
           <a:xfrm flipV="1">
-            <a:off x="4818245" y="2137179"/>
+            <a:off x="4818245" y="1368523"/>
             <a:ext cx="3743261" cy="2502427"/>
           </a:xfrm>
           <a:prstGeom prst="bentConnector3">
@@ -9253,7 +9253,7 @@
         </p:nvSpPr>
         <p:spPr>
           <a:xfrm>
-            <a:off x="954056" y="1672690"/>
+            <a:off x="954056" y="904034"/>
             <a:ext cx="683651" cy="307777"/>
           </a:xfrm>
           <a:prstGeom prst="rect">
@@ -9286,7 +9286,7 @@
         </p:nvCxnSpPr>
         <p:spPr>
           <a:xfrm flipH="1" flipV="1">
-            <a:off x="1295882" y="1980467"/>
+            <a:off x="1295882" y="1211811"/>
             <a:ext cx="741548" cy="374864"/>
           </a:xfrm>
           <a:prstGeom prst="straightConnector1">
@@ -9322,7 +9322,7 @@
         </p:nvSpPr>
         <p:spPr>
           <a:xfrm>
-            <a:off x="1650976" y="1255281"/>
+            <a:off x="1650976" y="486625"/>
             <a:ext cx="883174" cy="307777"/>
           </a:xfrm>
           <a:prstGeom prst="rect">
@@ -9355,7 +9355,7 @@
         </p:nvCxnSpPr>
         <p:spPr>
           <a:xfrm flipV="1">
-            <a:off x="2037430" y="1563058"/>
+            <a:off x="2037430" y="794402"/>
             <a:ext cx="55133" cy="792273"/>
           </a:xfrm>
           <a:prstGeom prst="straightConnector1">
@@ -9391,7 +9391,7 @@
         </p:nvSpPr>
         <p:spPr>
           <a:xfrm>
-            <a:off x="2141696" y="2018774"/>
+            <a:off x="2141696" y="1250118"/>
             <a:ext cx="1003099" cy="307777"/>
           </a:xfrm>
           <a:prstGeom prst="rect">
@@ -9424,7 +9424,7 @@
         </p:nvCxnSpPr>
         <p:spPr>
           <a:xfrm flipV="1">
-            <a:off x="2037430" y="2172663"/>
+            <a:off x="2037430" y="1404007"/>
             <a:ext cx="104266" cy="182668"/>
           </a:xfrm>
           <a:prstGeom prst="straightConnector1">
@@ -9460,7 +9460,7 @@
         </p:nvSpPr>
         <p:spPr>
           <a:xfrm>
-            <a:off x="2141696" y="1814883"/>
+            <a:off x="2141696" y="1046227"/>
             <a:ext cx="923237" cy="307777"/>
           </a:xfrm>
           <a:prstGeom prst="rect">
@@ -9493,7 +9493,7 @@
         </p:nvCxnSpPr>
         <p:spPr>
           <a:xfrm flipV="1">
-            <a:off x="2037430" y="1968772"/>
+            <a:off x="2037430" y="1200116"/>
             <a:ext cx="104266" cy="386559"/>
           </a:xfrm>
           <a:prstGeom prst="straightConnector1">
@@ -9529,7 +9529,7 @@
         </p:nvSpPr>
         <p:spPr>
           <a:xfrm>
-            <a:off x="2936631" y="1251710"/>
+            <a:off x="2936631" y="483054"/>
             <a:ext cx="1083049" cy="307777"/>
           </a:xfrm>
           <a:prstGeom prst="rect">
@@ -9562,7 +9562,7 @@
         </p:nvCxnSpPr>
         <p:spPr>
           <a:xfrm flipV="1">
-            <a:off x="2534150" y="1405599"/>
+            <a:off x="2534150" y="636943"/>
             <a:ext cx="402481" cy="3571"/>
           </a:xfrm>
           <a:prstGeom prst="straightConnector1">
@@ -9598,7 +9598,7 @@
         </p:nvSpPr>
         <p:spPr>
           <a:xfrm>
-            <a:off x="2565780" y="1507106"/>
+            <a:off x="2565780" y="738450"/>
             <a:ext cx="972943" cy="307777"/>
           </a:xfrm>
           <a:prstGeom prst="rect">
@@ -9631,7 +9631,7 @@
         </p:nvCxnSpPr>
         <p:spPr>
           <a:xfrm>
-            <a:off x="2534150" y="1409170"/>
+            <a:off x="2534150" y="640514"/>
             <a:ext cx="31630" cy="251825"/>
           </a:xfrm>
           <a:prstGeom prst="straightConnector1">
@@ -9667,7 +9667,7 @@
         </p:nvSpPr>
         <p:spPr>
           <a:xfrm>
-            <a:off x="5119362" y="2301110"/>
+            <a:off x="5119362" y="1532454"/>
             <a:ext cx="786343" cy="738664"/>
           </a:xfrm>
           <a:prstGeom prst="rect">
@@ -9712,7 +9712,7 @@
         </p:nvSpPr>
         <p:spPr>
           <a:xfrm>
-            <a:off x="945196" y="1151214"/>
+            <a:off x="945196" y="382558"/>
             <a:ext cx="713457" cy="307777"/>
           </a:xfrm>
           <a:prstGeom prst="rect">
@@ -9745,7 +9745,7 @@
         </p:nvCxnSpPr>
         <p:spPr>
           <a:xfrm flipV="1">
-            <a:off x="1295882" y="1458991"/>
+            <a:off x="1295882" y="690335"/>
             <a:ext cx="6043" cy="213699"/>
           </a:xfrm>
           <a:prstGeom prst="straightConnector1">
@@ -9781,7 +9781,7 @@
         </p:nvSpPr>
         <p:spPr>
           <a:xfrm>
-            <a:off x="1003112" y="3022533"/>
+            <a:off x="1003112" y="2253877"/>
             <a:ext cx="663663" cy="307777"/>
           </a:xfrm>
           <a:prstGeom prst="rect">
@@ -9814,7 +9814,7 @@
         </p:nvCxnSpPr>
         <p:spPr>
           <a:xfrm>
-            <a:off x="1295882" y="1980467"/>
+            <a:off x="1295882" y="1211811"/>
             <a:ext cx="39062" cy="1042066"/>
           </a:xfrm>
           <a:prstGeom prst="straightConnector1">
@@ -9850,7 +9850,7 @@
         </p:nvSpPr>
         <p:spPr>
           <a:xfrm>
-            <a:off x="997789" y="2599204"/>
+            <a:off x="997789" y="1830548"/>
             <a:ext cx="871515" cy="307777"/>
           </a:xfrm>
           <a:prstGeom prst="rect">
@@ -9869,6 +9869,152 @@
               <a:t>exportId</a:t>
             </a:r>
             <a:endParaRPr lang="en-US" i="1" dirty="0"/>
+          </a:p>
+        </p:txBody>
+      </p:sp>
+      <p:sp>
+        <p:nvSpPr>
+          <p:cNvPr id="259" name="TextBox 258"/>
+          <p:cNvSpPr txBox="1"/>
+          <p:nvPr/>
+        </p:nvSpPr>
+        <p:spPr>
+          <a:xfrm>
+            <a:off x="3543785" y="3434371"/>
+            <a:ext cx="464052" cy="307777"/>
+          </a:xfrm>
+          <a:prstGeom prst="rect">
+            <a:avLst/>
+          </a:prstGeom>
+          <a:noFill/>
+        </p:spPr>
+        <p:txBody>
+          <a:bodyPr wrap="none" rtlCol="0">
+            <a:spAutoFit/>
+          </a:bodyPr>
+          <a:lstStyle/>
+          <a:p>
+            <a:pPr algn="ctr"/>
+            <a:r>
+              <a:rPr lang="en-US" dirty="0" smtClean="0"/>
+              <a:t>self</a:t>
+            </a:r>
+          </a:p>
+        </p:txBody>
+      </p:sp>
+      <p:cxnSp>
+        <p:nvCxnSpPr>
+          <p:cNvPr id="260" name="Straight Arrow Connector 259"/>
+          <p:cNvCxnSpPr>
+            <a:stCxn id="14" idx="0"/>
+            <a:endCxn id="259" idx="3"/>
+          </p:cNvCxnSpPr>
+          <p:nvPr/>
+        </p:nvCxnSpPr>
+        <p:spPr>
+          <a:xfrm flipH="1" flipV="1">
+            <a:off x="4007837" y="3588260"/>
+            <a:ext cx="474419" cy="128801"/>
+          </a:xfrm>
+          <a:prstGeom prst="straightConnector1">
+            <a:avLst/>
+          </a:prstGeom>
+          <a:ln>
+            <a:solidFill>
+              <a:schemeClr val="tx1"/>
+            </a:solidFill>
+            <a:tailEnd type="arrow"/>
+          </a:ln>
+        </p:spPr>
+        <p:style>
+          <a:lnRef idx="1">
+            <a:schemeClr val="accent1"/>
+          </a:lnRef>
+          <a:fillRef idx="0">
+            <a:schemeClr val="accent1"/>
+          </a:fillRef>
+          <a:effectRef idx="0">
+            <a:schemeClr val="accent1"/>
+          </a:effectRef>
+          <a:fontRef idx="minor">
+            <a:schemeClr val="tx1"/>
+          </a:fontRef>
+        </p:style>
+      </p:cxnSp>
+      <p:sp>
+        <p:nvSpPr>
+          <p:cNvPr id="263" name="Rounded Rectangle 262"/>
+          <p:cNvSpPr/>
+          <p:nvPr/>
+        </p:nvSpPr>
+        <p:spPr>
+          <a:xfrm>
+            <a:off x="5675841" y="3819325"/>
+            <a:ext cx="3063447" cy="205513"/>
+          </a:xfrm>
+          <a:prstGeom prst="roundRect">
+            <a:avLst>
+              <a:gd name="adj" fmla="val 50000"/>
+            </a:avLst>
+          </a:prstGeom>
+          <a:noFill/>
+          <a:ln>
+            <a:noFill/>
+          </a:ln>
+          <a:effectLst/>
+        </p:spPr>
+        <p:style>
+          <a:lnRef idx="1">
+            <a:schemeClr val="accent1"/>
+          </a:lnRef>
+          <a:fillRef idx="3">
+            <a:schemeClr val="accent1"/>
+          </a:fillRef>
+          <a:effectRef idx="2">
+            <a:schemeClr val="accent1"/>
+          </a:effectRef>
+          <a:fontRef idx="minor">
+            <a:schemeClr val="lt1"/>
+          </a:fontRef>
+        </p:style>
+        <p:txBody>
+          <a:bodyPr anchor="ctr"/>
+          <a:lstStyle/>
+          <a:p>
+            <a:pPr algn="r"/>
+            <a:r>
+              <a:rPr lang="en-US" sz="600" dirty="0" smtClean="0">
+                <a:solidFill>
+                  <a:schemeClr val="bg1">
+                    <a:lumMod val="75000"/>
+                  </a:schemeClr>
+                </a:solidFill>
+                <a:latin typeface="Open Sans Light"/>
+                <a:cs typeface="Open Sans Light"/>
+              </a:rPr>
+              <a:t>iot-samsung-api-v01.</a:t>
+            </a:r>
+            <a:r>
+              <a:rPr lang="en-US" sz="600" dirty="0" smtClean="0">
+                <a:solidFill>
+                  <a:schemeClr val="bg1">
+                    <a:lumMod val="75000"/>
+                  </a:schemeClr>
+                </a:solidFill>
+                <a:latin typeface="Open Sans Light"/>
+                <a:cs typeface="Open Sans Light"/>
+              </a:rPr>
+              <a:t>pptx. Copyright 2016 Wilson Mar.  All rights reserved.</a:t>
+            </a:r>
+            <a:endParaRPr lang="en-US" sz="600" dirty="0">
+              <a:solidFill>
+                <a:schemeClr val="bg1">
+                  <a:lumMod val="75000"/>
+                </a:schemeClr>
+              </a:solidFill>
+              <a:latin typeface="Open Sans Light"/>
+              <a:cs typeface="Open Sans Light"/>
+            </a:endParaRPr>
           </a:p>
         </p:txBody>
       </p:sp>

</xml_diff>